<commit_message>
update slides and demo
</commit_message>
<xml_diff>
--- a/2021 Apr - Unit testing best practices and common pitfalls/slides.pptx
+++ b/2021 Apr - Unit testing best practices and common pitfalls/slides.pptx
@@ -3253,7 +3253,7 @@
               <a:buFont typeface="Arial" panose="020B0604020202020204" pitchFamily="34" charset="0"/>
               <a:buNone/>
             </a:pPr>
-            <a:endParaRPr lang="en-US" dirty="0"/>
+            <a:endParaRPr lang="bg-BG" dirty="0"/>
           </a:p>
         </p:txBody>
       </p:sp>
@@ -3274,7 +3274,7 @@
           <a:p>
             <a:fld id="{A6582097-6A88-44F9-AC05-59CA5E6DC7BB}" type="slidenum">
               <a:rPr lang="en-US" smtClean="0"/>
-              <a:t>11</a:t>
+              <a:t>10</a:t>
             </a:fld>
             <a:endParaRPr lang="en-US"/>
           </a:p>
@@ -3283,7 +3283,7 @@
     </p:spTree>
     <p:extLst>
       <p:ext uri="{BB962C8B-B14F-4D97-AF65-F5344CB8AC3E}">
-        <p14:creationId xmlns:p14="http://schemas.microsoft.com/office/powerpoint/2010/main" val="810541056"/>
+        <p14:creationId xmlns:p14="http://schemas.microsoft.com/office/powerpoint/2010/main" val="333344436"/>
       </p:ext>
     </p:extLst>
   </p:cSld>
@@ -3337,7 +3337,7 @@
           <a:bodyPr/>
           <a:lstStyle/>
           <a:p>
-            <a:pPr marL="0" lvl="0" indent="0">
+            <a:pPr marL="0" indent="0">
               <a:buFont typeface="Arial" panose="020B0604020202020204" pitchFamily="34" charset="0"/>
               <a:buNone/>
             </a:pPr>
@@ -3362,7 +3362,7 @@
           <a:p>
             <a:fld id="{A6582097-6A88-44F9-AC05-59CA5E6DC7BB}" type="slidenum">
               <a:rPr lang="en-US" smtClean="0"/>
-              <a:t>12</a:t>
+              <a:t>11</a:t>
             </a:fld>
             <a:endParaRPr lang="en-US"/>
           </a:p>
@@ -3371,7 +3371,7 @@
     </p:spTree>
     <p:extLst>
       <p:ext uri="{BB962C8B-B14F-4D97-AF65-F5344CB8AC3E}">
-        <p14:creationId xmlns:p14="http://schemas.microsoft.com/office/powerpoint/2010/main" val="3595960897"/>
+        <p14:creationId xmlns:p14="http://schemas.microsoft.com/office/powerpoint/2010/main" val="810541056"/>
       </p:ext>
     </p:extLst>
   </p:cSld>
@@ -3425,22 +3425,9 @@
           <a:bodyPr/>
           <a:lstStyle/>
           <a:p>
-            <a:pPr marL="0" marR="0" lvl="0" indent="0" algn="l" defTabSz="914400" rtl="0" eaLnBrk="1" fontAlgn="auto" latinLnBrk="0" hangingPunct="1">
-              <a:lnSpc>
-                <a:spcPct val="100000"/>
-              </a:lnSpc>
-              <a:spcBef>
-                <a:spcPts val="0"/>
-              </a:spcBef>
-              <a:spcAft>
-                <a:spcPts val="0"/>
-              </a:spcAft>
-              <a:buClrTx/>
-              <a:buSzTx/>
+            <a:pPr marL="0" lvl="0" indent="0">
               <a:buFont typeface="Arial" panose="020B0604020202020204" pitchFamily="34" charset="0"/>
               <a:buNone/>
-              <a:tabLst/>
-              <a:defRPr/>
             </a:pPr>
             <a:endParaRPr lang="en-US" dirty="0"/>
           </a:p>
@@ -3463,7 +3450,7 @@
           <a:p>
             <a:fld id="{A6582097-6A88-44F9-AC05-59CA5E6DC7BB}" type="slidenum">
               <a:rPr lang="en-US" smtClean="0"/>
-              <a:t>13</a:t>
+              <a:t>12</a:t>
             </a:fld>
             <a:endParaRPr lang="en-US"/>
           </a:p>
@@ -3472,7 +3459,7 @@
     </p:spTree>
     <p:extLst>
       <p:ext uri="{BB962C8B-B14F-4D97-AF65-F5344CB8AC3E}">
-        <p14:creationId xmlns:p14="http://schemas.microsoft.com/office/powerpoint/2010/main" val="1707662101"/>
+        <p14:creationId xmlns:p14="http://schemas.microsoft.com/office/powerpoint/2010/main" val="3595960897"/>
       </p:ext>
     </p:extLst>
   </p:cSld>
@@ -3526,9 +3513,22 @@
           <a:bodyPr/>
           <a:lstStyle/>
           <a:p>
-            <a:pPr marL="0" indent="0">
+            <a:pPr marL="0" marR="0" lvl="0" indent="0" algn="l" defTabSz="914400" rtl="0" eaLnBrk="1" fontAlgn="auto" latinLnBrk="0" hangingPunct="1">
+              <a:lnSpc>
+                <a:spcPct val="100000"/>
+              </a:lnSpc>
+              <a:spcBef>
+                <a:spcPts val="0"/>
+              </a:spcBef>
+              <a:spcAft>
+                <a:spcPts val="0"/>
+              </a:spcAft>
+              <a:buClrTx/>
+              <a:buSzTx/>
               <a:buFont typeface="Arial" panose="020B0604020202020204" pitchFamily="34" charset="0"/>
               <a:buNone/>
+              <a:tabLst/>
+              <a:defRPr/>
             </a:pPr>
             <a:endParaRPr lang="en-US" dirty="0"/>
           </a:p>
@@ -3551,7 +3551,7 @@
           <a:p>
             <a:fld id="{A6582097-6A88-44F9-AC05-59CA5E6DC7BB}" type="slidenum">
               <a:rPr lang="en-US" smtClean="0"/>
-              <a:t>14</a:t>
+              <a:t>13</a:t>
             </a:fld>
             <a:endParaRPr lang="en-US"/>
           </a:p>
@@ -3560,7 +3560,7 @@
     </p:spTree>
     <p:extLst>
       <p:ext uri="{BB962C8B-B14F-4D97-AF65-F5344CB8AC3E}">
-        <p14:creationId xmlns:p14="http://schemas.microsoft.com/office/powerpoint/2010/main" val="307187569"/>
+        <p14:creationId xmlns:p14="http://schemas.microsoft.com/office/powerpoint/2010/main" val="1707662101"/>
       </p:ext>
     </p:extLst>
   </p:cSld>
@@ -3618,11 +3618,7 @@
               <a:buFont typeface="Arial" panose="020B0604020202020204" pitchFamily="34" charset="0"/>
               <a:buNone/>
             </a:pPr>
-            <a:endParaRPr lang="en-US" b="0" dirty="0">
-              <a:solidFill>
-                <a:srgbClr val="FF0000"/>
-              </a:solidFill>
-            </a:endParaRPr>
+            <a:endParaRPr lang="en-US" dirty="0"/>
           </a:p>
         </p:txBody>
       </p:sp>
@@ -3643,7 +3639,7 @@
           <a:p>
             <a:fld id="{A6582097-6A88-44F9-AC05-59CA5E6DC7BB}" type="slidenum">
               <a:rPr lang="en-US" smtClean="0"/>
-              <a:t>16</a:t>
+              <a:t>14</a:t>
             </a:fld>
             <a:endParaRPr lang="en-US"/>
           </a:p>
@@ -3652,7 +3648,7 @@
     </p:spTree>
     <p:extLst>
       <p:ext uri="{BB962C8B-B14F-4D97-AF65-F5344CB8AC3E}">
-        <p14:creationId xmlns:p14="http://schemas.microsoft.com/office/powerpoint/2010/main" val="2468283576"/>
+        <p14:creationId xmlns:p14="http://schemas.microsoft.com/office/powerpoint/2010/main" val="307187569"/>
       </p:ext>
     </p:extLst>
   </p:cSld>
@@ -3706,10 +3702,6 @@
           <a:bodyPr/>
           <a:lstStyle/>
           <a:p>
-            <a:pPr marL="0" indent="0">
-              <a:buFont typeface="Arial" panose="020B0604020202020204" pitchFamily="34" charset="0"/>
-              <a:buNone/>
-            </a:pPr>
             <a:endParaRPr lang="en-US" dirty="0"/>
           </a:p>
         </p:txBody>
@@ -3731,7 +3723,7 @@
           <a:p>
             <a:fld id="{A6582097-6A88-44F9-AC05-59CA5E6DC7BB}" type="slidenum">
               <a:rPr lang="en-US" smtClean="0"/>
-              <a:t>17</a:t>
+              <a:t>15</a:t>
             </a:fld>
             <a:endParaRPr lang="en-US"/>
           </a:p>
@@ -3740,7 +3732,7 @@
     </p:spTree>
     <p:extLst>
       <p:ext uri="{BB962C8B-B14F-4D97-AF65-F5344CB8AC3E}">
-        <p14:creationId xmlns:p14="http://schemas.microsoft.com/office/powerpoint/2010/main" val="3055427452"/>
+        <p14:creationId xmlns:p14="http://schemas.microsoft.com/office/powerpoint/2010/main" val="2100497848"/>
       </p:ext>
     </p:extLst>
   </p:cSld>
@@ -3794,24 +3786,15 @@
           <a:bodyPr/>
           <a:lstStyle/>
           <a:p>
-            <a:pPr marL="171450" marR="0" lvl="0" indent="-171450" algn="l" defTabSz="914400" rtl="0" eaLnBrk="1" fontAlgn="auto" latinLnBrk="0" hangingPunct="1">
-              <a:lnSpc>
-                <a:spcPct val="100000"/>
-              </a:lnSpc>
-              <a:spcBef>
-                <a:spcPts val="0"/>
-              </a:spcBef>
-              <a:spcAft>
-                <a:spcPts val="0"/>
-              </a:spcAft>
-              <a:buClrTx/>
-              <a:buSzTx/>
+            <a:pPr marL="0" indent="0">
               <a:buFont typeface="Arial" panose="020B0604020202020204" pitchFamily="34" charset="0"/>
-              <a:buChar char="•"/>
-              <a:tabLst/>
-              <a:defRPr/>
+              <a:buNone/>
             </a:pPr>
-            <a:endParaRPr lang="en-US" dirty="0"/>
+            <a:endParaRPr lang="en-US" b="0" dirty="0">
+              <a:solidFill>
+                <a:srgbClr val="FF0000"/>
+              </a:solidFill>
+            </a:endParaRPr>
           </a:p>
         </p:txBody>
       </p:sp>
@@ -3832,7 +3815,7 @@
           <a:p>
             <a:fld id="{A6582097-6A88-44F9-AC05-59CA5E6DC7BB}" type="slidenum">
               <a:rPr lang="en-US" smtClean="0"/>
-              <a:t>18</a:t>
+              <a:t>16</a:t>
             </a:fld>
             <a:endParaRPr lang="en-US"/>
           </a:p>
@@ -3841,7 +3824,7 @@
     </p:spTree>
     <p:extLst>
       <p:ext uri="{BB962C8B-B14F-4D97-AF65-F5344CB8AC3E}">
-        <p14:creationId xmlns:p14="http://schemas.microsoft.com/office/powerpoint/2010/main" val="4053920628"/>
+        <p14:creationId xmlns:p14="http://schemas.microsoft.com/office/powerpoint/2010/main" val="2468283576"/>
       </p:ext>
     </p:extLst>
   </p:cSld>
@@ -3895,6 +3878,10 @@
           <a:bodyPr/>
           <a:lstStyle/>
           <a:p>
+            <a:pPr marL="0" indent="0">
+              <a:buFont typeface="Arial" panose="020B0604020202020204" pitchFamily="34" charset="0"/>
+              <a:buNone/>
+            </a:pPr>
             <a:endParaRPr lang="en-US" dirty="0"/>
           </a:p>
         </p:txBody>
@@ -3916,7 +3903,7 @@
           <a:p>
             <a:fld id="{A6582097-6A88-44F9-AC05-59CA5E6DC7BB}" type="slidenum">
               <a:rPr lang="en-US" smtClean="0"/>
-              <a:t>19</a:t>
+              <a:t>17</a:t>
             </a:fld>
             <a:endParaRPr lang="en-US"/>
           </a:p>
@@ -3925,7 +3912,7 @@
     </p:spTree>
     <p:extLst>
       <p:ext uri="{BB962C8B-B14F-4D97-AF65-F5344CB8AC3E}">
-        <p14:creationId xmlns:p14="http://schemas.microsoft.com/office/powerpoint/2010/main" val="2669049105"/>
+        <p14:creationId xmlns:p14="http://schemas.microsoft.com/office/powerpoint/2010/main" val="3055427452"/>
       </p:ext>
     </p:extLst>
   </p:cSld>
@@ -4017,7 +4004,7 @@
           <a:p>
             <a:fld id="{A6582097-6A88-44F9-AC05-59CA5E6DC7BB}" type="slidenum">
               <a:rPr lang="en-US" smtClean="0"/>
-              <a:t>20</a:t>
+              <a:t>18</a:t>
             </a:fld>
             <a:endParaRPr lang="en-US"/>
           </a:p>
@@ -4026,7 +4013,7 @@
     </p:spTree>
     <p:extLst>
       <p:ext uri="{BB962C8B-B14F-4D97-AF65-F5344CB8AC3E}">
-        <p14:creationId xmlns:p14="http://schemas.microsoft.com/office/powerpoint/2010/main" val="1070814951"/>
+        <p14:creationId xmlns:p14="http://schemas.microsoft.com/office/powerpoint/2010/main" val="4053920628"/>
       </p:ext>
     </p:extLst>
   </p:cSld>
@@ -4080,10 +4067,6 @@
           <a:bodyPr/>
           <a:lstStyle/>
           <a:p>
-            <a:pPr marL="0" indent="0">
-              <a:buFont typeface="Arial" panose="020B0604020202020204" pitchFamily="34" charset="0"/>
-              <a:buNone/>
-            </a:pPr>
             <a:endParaRPr lang="en-US" dirty="0"/>
           </a:p>
         </p:txBody>
@@ -4105,7 +4088,7 @@
           <a:p>
             <a:fld id="{A6582097-6A88-44F9-AC05-59CA5E6DC7BB}" type="slidenum">
               <a:rPr lang="en-US" smtClean="0"/>
-              <a:t>21</a:t>
+              <a:t>19</a:t>
             </a:fld>
             <a:endParaRPr lang="en-US"/>
           </a:p>
@@ -4114,7 +4097,7 @@
     </p:spTree>
     <p:extLst>
       <p:ext uri="{BB962C8B-B14F-4D97-AF65-F5344CB8AC3E}">
-        <p14:creationId xmlns:p14="http://schemas.microsoft.com/office/powerpoint/2010/main" val="3598697346"/>
+        <p14:creationId xmlns:p14="http://schemas.microsoft.com/office/powerpoint/2010/main" val="2669049105"/>
       </p:ext>
     </p:extLst>
   </p:cSld>
@@ -4168,7 +4151,7 @@
           <a:bodyPr/>
           <a:lstStyle/>
           <a:p>
-            <a:pPr marL="171450" marR="0" lvl="0" indent="-171450" algn="l" defTabSz="914400" rtl="0" eaLnBrk="1" fontAlgn="auto" latinLnBrk="0" hangingPunct="1">
+            <a:pPr marL="0" marR="0" lvl="0" indent="0" algn="l" defTabSz="914400" rtl="0" eaLnBrk="1" fontAlgn="auto" latinLnBrk="0" hangingPunct="1">
               <a:lnSpc>
                 <a:spcPct val="100000"/>
               </a:lnSpc>
@@ -4181,7 +4164,7 @@
               <a:buClrTx/>
               <a:buSzTx/>
               <a:buFont typeface="Arial" panose="020B0604020202020204" pitchFamily="34" charset="0"/>
-              <a:buChar char="•"/>
+              <a:buNone/>
               <a:tabLst/>
               <a:defRPr/>
             </a:pPr>
@@ -4269,9 +4252,22 @@
           <a:bodyPr/>
           <a:lstStyle/>
           <a:p>
-            <a:pPr marL="0" lvl="0" indent="0">
+            <a:pPr marL="0" marR="0" lvl="0" indent="0" algn="l" defTabSz="914400" rtl="0" eaLnBrk="1" fontAlgn="auto" latinLnBrk="0" hangingPunct="1">
+              <a:lnSpc>
+                <a:spcPct val="100000"/>
+              </a:lnSpc>
+              <a:spcBef>
+                <a:spcPts val="0"/>
+              </a:spcBef>
+              <a:spcAft>
+                <a:spcPts val="0"/>
+              </a:spcAft>
+              <a:buClrTx/>
+              <a:buSzTx/>
               <a:buFont typeface="Arial" panose="020B0604020202020204" pitchFamily="34" charset="0"/>
               <a:buNone/>
+              <a:tabLst/>
+              <a:defRPr/>
             </a:pPr>
             <a:endParaRPr lang="en-US" dirty="0"/>
           </a:p>
@@ -4294,7 +4290,7 @@
           <a:p>
             <a:fld id="{A6582097-6A88-44F9-AC05-59CA5E6DC7BB}" type="slidenum">
               <a:rPr lang="en-US" smtClean="0"/>
-              <a:t>22</a:t>
+              <a:t>20</a:t>
             </a:fld>
             <a:endParaRPr lang="en-US"/>
           </a:p>
@@ -4303,7 +4299,7 @@
     </p:spTree>
     <p:extLst>
       <p:ext uri="{BB962C8B-B14F-4D97-AF65-F5344CB8AC3E}">
-        <p14:creationId xmlns:p14="http://schemas.microsoft.com/office/powerpoint/2010/main" val="2785869258"/>
+        <p14:creationId xmlns:p14="http://schemas.microsoft.com/office/powerpoint/2010/main" val="1070814951"/>
       </p:ext>
     </p:extLst>
   </p:cSld>
@@ -4357,22 +4353,9 @@
           <a:bodyPr/>
           <a:lstStyle/>
           <a:p>
-            <a:pPr marL="0" marR="0" lvl="0" indent="0" algn="l" defTabSz="914400" rtl="0" eaLnBrk="1" fontAlgn="auto" latinLnBrk="0" hangingPunct="1">
-              <a:lnSpc>
-                <a:spcPct val="100000"/>
-              </a:lnSpc>
-              <a:spcBef>
-                <a:spcPts val="0"/>
-              </a:spcBef>
-              <a:spcAft>
-                <a:spcPts val="0"/>
-              </a:spcAft>
-              <a:buClrTx/>
-              <a:buSzTx/>
+            <a:pPr marL="0" indent="0">
               <a:buFont typeface="Arial" panose="020B0604020202020204" pitchFamily="34" charset="0"/>
               <a:buNone/>
-              <a:tabLst/>
-              <a:defRPr/>
             </a:pPr>
             <a:endParaRPr lang="en-US" dirty="0"/>
           </a:p>
@@ -4395,7 +4378,7 @@
           <a:p>
             <a:fld id="{A6582097-6A88-44F9-AC05-59CA5E6DC7BB}" type="slidenum">
               <a:rPr lang="en-US" smtClean="0"/>
-              <a:t>23</a:t>
+              <a:t>21</a:t>
             </a:fld>
             <a:endParaRPr lang="en-US"/>
           </a:p>
@@ -4404,7 +4387,7 @@
     </p:spTree>
     <p:extLst>
       <p:ext uri="{BB962C8B-B14F-4D97-AF65-F5344CB8AC3E}">
-        <p14:creationId xmlns:p14="http://schemas.microsoft.com/office/powerpoint/2010/main" val="2037331979"/>
+        <p14:creationId xmlns:p14="http://schemas.microsoft.com/office/powerpoint/2010/main" val="3598697346"/>
       </p:ext>
     </p:extLst>
   </p:cSld>
@@ -4458,7 +4441,7 @@
           <a:bodyPr/>
           <a:lstStyle/>
           <a:p>
-            <a:pPr marL="0" indent="0">
+            <a:pPr marL="0" lvl="0" indent="0">
               <a:buFont typeface="Arial" panose="020B0604020202020204" pitchFamily="34" charset="0"/>
               <a:buNone/>
             </a:pPr>
@@ -4483,7 +4466,7 @@
           <a:p>
             <a:fld id="{A6582097-6A88-44F9-AC05-59CA5E6DC7BB}" type="slidenum">
               <a:rPr lang="en-US" smtClean="0"/>
-              <a:t>24</a:t>
+              <a:t>22</a:t>
             </a:fld>
             <a:endParaRPr lang="en-US"/>
           </a:p>
@@ -4492,7 +4475,7 @@
     </p:spTree>
     <p:extLst>
       <p:ext uri="{BB962C8B-B14F-4D97-AF65-F5344CB8AC3E}">
-        <p14:creationId xmlns:p14="http://schemas.microsoft.com/office/powerpoint/2010/main" val="3625354821"/>
+        <p14:creationId xmlns:p14="http://schemas.microsoft.com/office/powerpoint/2010/main" val="2785869258"/>
       </p:ext>
     </p:extLst>
   </p:cSld>
@@ -4546,9 +4529,22 @@
           <a:bodyPr/>
           <a:lstStyle/>
           <a:p>
-            <a:pPr marL="0" indent="0">
+            <a:pPr marL="0" marR="0" lvl="0" indent="0" algn="l" defTabSz="914400" rtl="0" eaLnBrk="1" fontAlgn="auto" latinLnBrk="0" hangingPunct="1">
+              <a:lnSpc>
+                <a:spcPct val="100000"/>
+              </a:lnSpc>
+              <a:spcBef>
+                <a:spcPts val="0"/>
+              </a:spcBef>
+              <a:spcAft>
+                <a:spcPts val="0"/>
+              </a:spcAft>
+              <a:buClrTx/>
+              <a:buSzTx/>
               <a:buFont typeface="Arial" panose="020B0604020202020204" pitchFamily="34" charset="0"/>
               <a:buNone/>
+              <a:tabLst/>
+              <a:defRPr/>
             </a:pPr>
             <a:endParaRPr lang="en-US" dirty="0"/>
           </a:p>
@@ -4571,7 +4567,7 @@
           <a:p>
             <a:fld id="{A6582097-6A88-44F9-AC05-59CA5E6DC7BB}" type="slidenum">
               <a:rPr lang="en-US" smtClean="0"/>
-              <a:t>25</a:t>
+              <a:t>23</a:t>
             </a:fld>
             <a:endParaRPr lang="en-US"/>
           </a:p>
@@ -4580,7 +4576,7 @@
     </p:spTree>
     <p:extLst>
       <p:ext uri="{BB962C8B-B14F-4D97-AF65-F5344CB8AC3E}">
-        <p14:creationId xmlns:p14="http://schemas.microsoft.com/office/powerpoint/2010/main" val="559115781"/>
+        <p14:creationId xmlns:p14="http://schemas.microsoft.com/office/powerpoint/2010/main" val="2037331979"/>
       </p:ext>
     </p:extLst>
   </p:cSld>
@@ -4659,7 +4655,7 @@
           <a:p>
             <a:fld id="{A6582097-6A88-44F9-AC05-59CA5E6DC7BB}" type="slidenum">
               <a:rPr lang="en-US" smtClean="0"/>
-              <a:t>26</a:t>
+              <a:t>24</a:t>
             </a:fld>
             <a:endParaRPr lang="en-US"/>
           </a:p>
@@ -4668,7 +4664,7 @@
     </p:spTree>
     <p:extLst>
       <p:ext uri="{BB962C8B-B14F-4D97-AF65-F5344CB8AC3E}">
-        <p14:creationId xmlns:p14="http://schemas.microsoft.com/office/powerpoint/2010/main" val="11597316"/>
+        <p14:creationId xmlns:p14="http://schemas.microsoft.com/office/powerpoint/2010/main" val="3625354821"/>
       </p:ext>
     </p:extLst>
   </p:cSld>
@@ -4747,7 +4743,7 @@
           <a:p>
             <a:fld id="{A6582097-6A88-44F9-AC05-59CA5E6DC7BB}" type="slidenum">
               <a:rPr lang="en-US" smtClean="0"/>
-              <a:t>27</a:t>
+              <a:t>25</a:t>
             </a:fld>
             <a:endParaRPr lang="en-US"/>
           </a:p>
@@ -4756,7 +4752,7 @@
     </p:spTree>
     <p:extLst>
       <p:ext uri="{BB962C8B-B14F-4D97-AF65-F5344CB8AC3E}">
-        <p14:creationId xmlns:p14="http://schemas.microsoft.com/office/powerpoint/2010/main" val="1746385651"/>
+        <p14:creationId xmlns:p14="http://schemas.microsoft.com/office/powerpoint/2010/main" val="559115781"/>
       </p:ext>
     </p:extLst>
   </p:cSld>
@@ -4835,7 +4831,7 @@
           <a:p>
             <a:fld id="{A6582097-6A88-44F9-AC05-59CA5E6DC7BB}" type="slidenum">
               <a:rPr lang="en-US" smtClean="0"/>
-              <a:t>28</a:t>
+              <a:t>26</a:t>
             </a:fld>
             <a:endParaRPr lang="en-US"/>
           </a:p>
@@ -4844,7 +4840,7 @@
     </p:spTree>
     <p:extLst>
       <p:ext uri="{BB962C8B-B14F-4D97-AF65-F5344CB8AC3E}">
-        <p14:creationId xmlns:p14="http://schemas.microsoft.com/office/powerpoint/2010/main" val="2965336363"/>
+        <p14:creationId xmlns:p14="http://schemas.microsoft.com/office/powerpoint/2010/main" val="11597316"/>
       </p:ext>
     </p:extLst>
   </p:cSld>
@@ -4923,7 +4919,7 @@
           <a:p>
             <a:fld id="{A6582097-6A88-44F9-AC05-59CA5E6DC7BB}" type="slidenum">
               <a:rPr lang="en-US" smtClean="0"/>
-              <a:t>29</a:t>
+              <a:t>27</a:t>
             </a:fld>
             <a:endParaRPr lang="en-US"/>
           </a:p>
@@ -4932,7 +4928,7 @@
     </p:spTree>
     <p:extLst>
       <p:ext uri="{BB962C8B-B14F-4D97-AF65-F5344CB8AC3E}">
-        <p14:creationId xmlns:p14="http://schemas.microsoft.com/office/powerpoint/2010/main" val="389658892"/>
+        <p14:creationId xmlns:p14="http://schemas.microsoft.com/office/powerpoint/2010/main" val="1746385651"/>
       </p:ext>
     </p:extLst>
   </p:cSld>
@@ -5011,7 +5007,7 @@
           <a:p>
             <a:fld id="{A6582097-6A88-44F9-AC05-59CA5E6DC7BB}" type="slidenum">
               <a:rPr lang="en-US" smtClean="0"/>
-              <a:t>30</a:t>
+              <a:t>28</a:t>
             </a:fld>
             <a:endParaRPr lang="en-US"/>
           </a:p>
@@ -5020,7 +5016,7 @@
     </p:spTree>
     <p:extLst>
       <p:ext uri="{BB962C8B-B14F-4D97-AF65-F5344CB8AC3E}">
-        <p14:creationId xmlns:p14="http://schemas.microsoft.com/office/powerpoint/2010/main" val="1464249215"/>
+        <p14:creationId xmlns:p14="http://schemas.microsoft.com/office/powerpoint/2010/main" val="2965336363"/>
       </p:ext>
     </p:extLst>
   </p:cSld>
@@ -5074,6 +5070,10 @@
           <a:bodyPr/>
           <a:lstStyle/>
           <a:p>
+            <a:pPr marL="0" indent="0">
+              <a:buFont typeface="Arial" panose="020B0604020202020204" pitchFamily="34" charset="0"/>
+              <a:buNone/>
+            </a:pPr>
             <a:endParaRPr lang="en-US" dirty="0"/>
           </a:p>
         </p:txBody>
@@ -5095,7 +5095,7 @@
           <a:p>
             <a:fld id="{A6582097-6A88-44F9-AC05-59CA5E6DC7BB}" type="slidenum">
               <a:rPr lang="en-US" smtClean="0"/>
-              <a:t>32</a:t>
+              <a:t>29</a:t>
             </a:fld>
             <a:endParaRPr lang="en-US"/>
           </a:p>
@@ -5104,7 +5104,7 @@
     </p:spTree>
     <p:extLst>
       <p:ext uri="{BB962C8B-B14F-4D97-AF65-F5344CB8AC3E}">
-        <p14:creationId xmlns:p14="http://schemas.microsoft.com/office/powerpoint/2010/main" val="4217342836"/>
+        <p14:creationId xmlns:p14="http://schemas.microsoft.com/office/powerpoint/2010/main" val="389658892"/>
       </p:ext>
     </p:extLst>
   </p:cSld>
@@ -5183,7 +5183,7 @@
           <a:p>
             <a:fld id="{A6582097-6A88-44F9-AC05-59CA5E6DC7BB}" type="slidenum">
               <a:rPr lang="en-US" smtClean="0"/>
-              <a:t>4</a:t>
+              <a:t>3</a:t>
             </a:fld>
             <a:endParaRPr lang="en-US"/>
           </a:p>
@@ -5192,7 +5192,7 @@
     </p:spTree>
     <p:extLst>
       <p:ext uri="{BB962C8B-B14F-4D97-AF65-F5344CB8AC3E}">
-        <p14:creationId xmlns:p14="http://schemas.microsoft.com/office/powerpoint/2010/main" val="2824013056"/>
+        <p14:creationId xmlns:p14="http://schemas.microsoft.com/office/powerpoint/2010/main" val="2565526556"/>
       </p:ext>
     </p:extLst>
   </p:cSld>
@@ -5246,6 +5246,262 @@
           <a:bodyPr/>
           <a:lstStyle/>
           <a:p>
+            <a:pPr marL="0" indent="0">
+              <a:buFont typeface="Arial" panose="020B0604020202020204" pitchFamily="34" charset="0"/>
+              <a:buNone/>
+            </a:pPr>
+            <a:endParaRPr lang="en-US" dirty="0"/>
+          </a:p>
+        </p:txBody>
+      </p:sp>
+      <p:sp>
+        <p:nvSpPr>
+          <p:cNvPr id="4" name="Slide Number Placeholder 3"/>
+          <p:cNvSpPr>
+            <a:spLocks noGrp="1"/>
+          </p:cNvSpPr>
+          <p:nvPr>
+            <p:ph type="sldNum" sz="quarter" idx="5"/>
+          </p:nvPr>
+        </p:nvSpPr>
+        <p:spPr/>
+        <p:txBody>
+          <a:bodyPr/>
+          <a:lstStyle/>
+          <a:p>
+            <a:fld id="{A6582097-6A88-44F9-AC05-59CA5E6DC7BB}" type="slidenum">
+              <a:rPr lang="en-US" smtClean="0"/>
+              <a:t>30</a:t>
+            </a:fld>
+            <a:endParaRPr lang="en-US"/>
+          </a:p>
+        </p:txBody>
+      </p:sp>
+    </p:spTree>
+    <p:extLst>
+      <p:ext uri="{BB962C8B-B14F-4D97-AF65-F5344CB8AC3E}">
+        <p14:creationId xmlns:p14="http://schemas.microsoft.com/office/powerpoint/2010/main" val="1464249215"/>
+      </p:ext>
+    </p:extLst>
+  </p:cSld>
+  <p:clrMapOvr>
+    <a:masterClrMapping/>
+  </p:clrMapOvr>
+</p:notes>
+</file>
+
+<file path=ppt/notesSlides/notesSlide31.xml><?xml version="1.0" encoding="utf-8"?>
+<p:notes xmlns:a="http://schemas.openxmlformats.org/drawingml/2006/main" xmlns:r="http://schemas.openxmlformats.org/officeDocument/2006/relationships" xmlns:p="http://schemas.openxmlformats.org/presentationml/2006/main">
+  <p:cSld>
+    <p:spTree>
+      <p:nvGrpSpPr>
+        <p:cNvPr id="1" name=""/>
+        <p:cNvGrpSpPr/>
+        <p:nvPr/>
+      </p:nvGrpSpPr>
+      <p:grpSpPr>
+        <a:xfrm>
+          <a:off x="0" y="0"/>
+          <a:ext cx="0" cy="0"/>
+          <a:chOff x="0" y="0"/>
+          <a:chExt cx="0" cy="0"/>
+        </a:xfrm>
+      </p:grpSpPr>
+      <p:sp>
+        <p:nvSpPr>
+          <p:cNvPr id="2" name="Slide Image Placeholder 1"/>
+          <p:cNvSpPr>
+            <a:spLocks noGrp="1" noRot="1" noChangeAspect="1"/>
+          </p:cNvSpPr>
+          <p:nvPr>
+            <p:ph type="sldImg"/>
+          </p:nvPr>
+        </p:nvSpPr>
+        <p:spPr/>
+      </p:sp>
+      <p:sp>
+        <p:nvSpPr>
+          <p:cNvPr id="3" name="Notes Placeholder 2"/>
+          <p:cNvSpPr>
+            <a:spLocks noGrp="1"/>
+          </p:cNvSpPr>
+          <p:nvPr>
+            <p:ph type="body" idx="1"/>
+          </p:nvPr>
+        </p:nvSpPr>
+        <p:spPr/>
+        <p:txBody>
+          <a:bodyPr/>
+          <a:lstStyle/>
+          <a:p>
+            <a:endParaRPr lang="en-US" dirty="0"/>
+          </a:p>
+        </p:txBody>
+      </p:sp>
+      <p:sp>
+        <p:nvSpPr>
+          <p:cNvPr id="4" name="Slide Number Placeholder 3"/>
+          <p:cNvSpPr>
+            <a:spLocks noGrp="1"/>
+          </p:cNvSpPr>
+          <p:nvPr>
+            <p:ph type="sldNum" sz="quarter" idx="5"/>
+          </p:nvPr>
+        </p:nvSpPr>
+        <p:spPr/>
+        <p:txBody>
+          <a:bodyPr/>
+          <a:lstStyle/>
+          <a:p>
+            <a:fld id="{A6582097-6A88-44F9-AC05-59CA5E6DC7BB}" type="slidenum">
+              <a:rPr lang="en-US" smtClean="0"/>
+              <a:t>31</a:t>
+            </a:fld>
+            <a:endParaRPr lang="en-US"/>
+          </a:p>
+        </p:txBody>
+      </p:sp>
+    </p:spTree>
+    <p:extLst>
+      <p:ext uri="{BB962C8B-B14F-4D97-AF65-F5344CB8AC3E}">
+        <p14:creationId xmlns:p14="http://schemas.microsoft.com/office/powerpoint/2010/main" val="2971374141"/>
+      </p:ext>
+    </p:extLst>
+  </p:cSld>
+  <p:clrMapOvr>
+    <a:masterClrMapping/>
+  </p:clrMapOvr>
+</p:notes>
+</file>
+
+<file path=ppt/notesSlides/notesSlide32.xml><?xml version="1.0" encoding="utf-8"?>
+<p:notes xmlns:a="http://schemas.openxmlformats.org/drawingml/2006/main" xmlns:r="http://schemas.openxmlformats.org/officeDocument/2006/relationships" xmlns:p="http://schemas.openxmlformats.org/presentationml/2006/main">
+  <p:cSld>
+    <p:spTree>
+      <p:nvGrpSpPr>
+        <p:cNvPr id="1" name=""/>
+        <p:cNvGrpSpPr/>
+        <p:nvPr/>
+      </p:nvGrpSpPr>
+      <p:grpSpPr>
+        <a:xfrm>
+          <a:off x="0" y="0"/>
+          <a:ext cx="0" cy="0"/>
+          <a:chOff x="0" y="0"/>
+          <a:chExt cx="0" cy="0"/>
+        </a:xfrm>
+      </p:grpSpPr>
+      <p:sp>
+        <p:nvSpPr>
+          <p:cNvPr id="2" name="Slide Image Placeholder 1"/>
+          <p:cNvSpPr>
+            <a:spLocks noGrp="1" noRot="1" noChangeAspect="1"/>
+          </p:cNvSpPr>
+          <p:nvPr>
+            <p:ph type="sldImg"/>
+          </p:nvPr>
+        </p:nvSpPr>
+        <p:spPr/>
+      </p:sp>
+      <p:sp>
+        <p:nvSpPr>
+          <p:cNvPr id="3" name="Notes Placeholder 2"/>
+          <p:cNvSpPr>
+            <a:spLocks noGrp="1"/>
+          </p:cNvSpPr>
+          <p:nvPr>
+            <p:ph type="body" idx="1"/>
+          </p:nvPr>
+        </p:nvSpPr>
+        <p:spPr/>
+        <p:txBody>
+          <a:bodyPr/>
+          <a:lstStyle/>
+          <a:p>
+            <a:endParaRPr lang="en-US" dirty="0"/>
+          </a:p>
+        </p:txBody>
+      </p:sp>
+      <p:sp>
+        <p:nvSpPr>
+          <p:cNvPr id="4" name="Slide Number Placeholder 3"/>
+          <p:cNvSpPr>
+            <a:spLocks noGrp="1"/>
+          </p:cNvSpPr>
+          <p:nvPr>
+            <p:ph type="sldNum" sz="quarter" idx="5"/>
+          </p:nvPr>
+        </p:nvSpPr>
+        <p:spPr/>
+        <p:txBody>
+          <a:bodyPr/>
+          <a:lstStyle/>
+          <a:p>
+            <a:fld id="{A6582097-6A88-44F9-AC05-59CA5E6DC7BB}" type="slidenum">
+              <a:rPr lang="en-US" smtClean="0"/>
+              <a:t>32</a:t>
+            </a:fld>
+            <a:endParaRPr lang="en-US"/>
+          </a:p>
+        </p:txBody>
+      </p:sp>
+    </p:spTree>
+    <p:extLst>
+      <p:ext uri="{BB962C8B-B14F-4D97-AF65-F5344CB8AC3E}">
+        <p14:creationId xmlns:p14="http://schemas.microsoft.com/office/powerpoint/2010/main" val="4217342836"/>
+      </p:ext>
+    </p:extLst>
+  </p:cSld>
+  <p:clrMapOvr>
+    <a:masterClrMapping/>
+  </p:clrMapOvr>
+</p:notes>
+</file>
+
+<file path=ppt/notesSlides/notesSlide33.xml><?xml version="1.0" encoding="utf-8"?>
+<p:notes xmlns:a="http://schemas.openxmlformats.org/drawingml/2006/main" xmlns:r="http://schemas.openxmlformats.org/officeDocument/2006/relationships" xmlns:p="http://schemas.openxmlformats.org/presentationml/2006/main">
+  <p:cSld>
+    <p:spTree>
+      <p:nvGrpSpPr>
+        <p:cNvPr id="1" name=""/>
+        <p:cNvGrpSpPr/>
+        <p:nvPr/>
+      </p:nvGrpSpPr>
+      <p:grpSpPr>
+        <a:xfrm>
+          <a:off x="0" y="0"/>
+          <a:ext cx="0" cy="0"/>
+          <a:chOff x="0" y="0"/>
+          <a:chExt cx="0" cy="0"/>
+        </a:xfrm>
+      </p:grpSpPr>
+      <p:sp>
+        <p:nvSpPr>
+          <p:cNvPr id="2" name="Slide Image Placeholder 1"/>
+          <p:cNvSpPr>
+            <a:spLocks noGrp="1" noRot="1" noChangeAspect="1"/>
+          </p:cNvSpPr>
+          <p:nvPr>
+            <p:ph type="sldImg"/>
+          </p:nvPr>
+        </p:nvSpPr>
+        <p:spPr/>
+      </p:sp>
+      <p:sp>
+        <p:nvSpPr>
+          <p:cNvPr id="3" name="Notes Placeholder 2"/>
+          <p:cNvSpPr>
+            <a:spLocks noGrp="1"/>
+          </p:cNvSpPr>
+          <p:nvPr>
+            <p:ph type="body" idx="1"/>
+          </p:nvPr>
+        </p:nvSpPr>
+        <p:spPr/>
+        <p:txBody>
+          <a:bodyPr/>
+          <a:lstStyle/>
+          <a:p>
             <a:endParaRPr lang="en-US" dirty="0"/>
           </a:p>
         </p:txBody>
@@ -5286,7 +5542,7 @@
 </p:notes>
 </file>
 
-<file path=ppt/notesSlides/notesSlide31.xml><?xml version="1.0" encoding="utf-8"?>
+<file path=ppt/notesSlides/notesSlide34.xml><?xml version="1.0" encoding="utf-8"?>
 <p:notes xmlns:a="http://schemas.openxmlformats.org/drawingml/2006/main" xmlns:r="http://schemas.openxmlformats.org/officeDocument/2006/relationships" xmlns:p="http://schemas.openxmlformats.org/presentationml/2006/main">
   <p:cSld>
     <p:spTree>
@@ -5443,7 +5699,7 @@
           <a:p>
             <a:fld id="{A6582097-6A88-44F9-AC05-59CA5E6DC7BB}" type="slidenum">
               <a:rPr lang="en-US" smtClean="0"/>
-              <a:t>5</a:t>
+              <a:t>4</a:t>
             </a:fld>
             <a:endParaRPr lang="en-US"/>
           </a:p>
@@ -5452,7 +5708,7 @@
     </p:spTree>
     <p:extLst>
       <p:ext uri="{BB962C8B-B14F-4D97-AF65-F5344CB8AC3E}">
-        <p14:creationId xmlns:p14="http://schemas.microsoft.com/office/powerpoint/2010/main" val="2743416663"/>
+        <p14:creationId xmlns:p14="http://schemas.microsoft.com/office/powerpoint/2010/main" val="2824013056"/>
       </p:ext>
     </p:extLst>
   </p:cSld>
@@ -5531,7 +5787,7 @@
           <a:p>
             <a:fld id="{A6582097-6A88-44F9-AC05-59CA5E6DC7BB}" type="slidenum">
               <a:rPr lang="en-US" smtClean="0"/>
-              <a:t>6</a:t>
+              <a:t>5</a:t>
             </a:fld>
             <a:endParaRPr lang="en-US"/>
           </a:p>
@@ -5540,7 +5796,7 @@
     </p:spTree>
     <p:extLst>
       <p:ext uri="{BB962C8B-B14F-4D97-AF65-F5344CB8AC3E}">
-        <p14:creationId xmlns:p14="http://schemas.microsoft.com/office/powerpoint/2010/main" val="3840829095"/>
+        <p14:creationId xmlns:p14="http://schemas.microsoft.com/office/powerpoint/2010/main" val="2743416663"/>
       </p:ext>
     </p:extLst>
   </p:cSld>
@@ -5619,7 +5875,7 @@
           <a:p>
             <a:fld id="{A6582097-6A88-44F9-AC05-59CA5E6DC7BB}" type="slidenum">
               <a:rPr lang="en-US" smtClean="0"/>
-              <a:t>7</a:t>
+              <a:t>6</a:t>
             </a:fld>
             <a:endParaRPr lang="en-US"/>
           </a:p>
@@ -5628,7 +5884,7 @@
     </p:spTree>
     <p:extLst>
       <p:ext uri="{BB962C8B-B14F-4D97-AF65-F5344CB8AC3E}">
-        <p14:creationId xmlns:p14="http://schemas.microsoft.com/office/powerpoint/2010/main" val="4260161927"/>
+        <p14:creationId xmlns:p14="http://schemas.microsoft.com/office/powerpoint/2010/main" val="3840829095"/>
       </p:ext>
     </p:extLst>
   </p:cSld>
@@ -5707,7 +5963,7 @@
           <a:p>
             <a:fld id="{A6582097-6A88-44F9-AC05-59CA5E6DC7BB}" type="slidenum">
               <a:rPr lang="en-US" smtClean="0"/>
-              <a:t>8</a:t>
+              <a:t>7</a:t>
             </a:fld>
             <a:endParaRPr lang="en-US"/>
           </a:p>
@@ -5716,7 +5972,7 @@
     </p:spTree>
     <p:extLst>
       <p:ext uri="{BB962C8B-B14F-4D97-AF65-F5344CB8AC3E}">
-        <p14:creationId xmlns:p14="http://schemas.microsoft.com/office/powerpoint/2010/main" val="586308092"/>
+        <p14:creationId xmlns:p14="http://schemas.microsoft.com/office/powerpoint/2010/main" val="4260161927"/>
       </p:ext>
     </p:extLst>
   </p:cSld>
@@ -5774,7 +6030,7 @@
               <a:buFont typeface="Arial" panose="020B0604020202020204" pitchFamily="34" charset="0"/>
               <a:buNone/>
             </a:pPr>
-            <a:endParaRPr lang="bg-BG" dirty="0"/>
+            <a:endParaRPr lang="en-US" dirty="0"/>
           </a:p>
         </p:txBody>
       </p:sp>
@@ -5795,7 +6051,7 @@
           <a:p>
             <a:fld id="{A6582097-6A88-44F9-AC05-59CA5E6DC7BB}" type="slidenum">
               <a:rPr lang="en-US" smtClean="0"/>
-              <a:t>9</a:t>
+              <a:t>8</a:t>
             </a:fld>
             <a:endParaRPr lang="en-US"/>
           </a:p>
@@ -5804,7 +6060,7 @@
     </p:spTree>
     <p:extLst>
       <p:ext uri="{BB962C8B-B14F-4D97-AF65-F5344CB8AC3E}">
-        <p14:creationId xmlns:p14="http://schemas.microsoft.com/office/powerpoint/2010/main" val="2634495189"/>
+        <p14:creationId xmlns:p14="http://schemas.microsoft.com/office/powerpoint/2010/main" val="586308092"/>
       </p:ext>
     </p:extLst>
   </p:cSld>
@@ -5883,7 +6139,7 @@
           <a:p>
             <a:fld id="{A6582097-6A88-44F9-AC05-59CA5E6DC7BB}" type="slidenum">
               <a:rPr lang="en-US" smtClean="0"/>
-              <a:t>10</a:t>
+              <a:t>9</a:t>
             </a:fld>
             <a:endParaRPr lang="en-US"/>
           </a:p>
@@ -5892,7 +6148,7 @@
     </p:spTree>
     <p:extLst>
       <p:ext uri="{BB962C8B-B14F-4D97-AF65-F5344CB8AC3E}">
-        <p14:creationId xmlns:p14="http://schemas.microsoft.com/office/powerpoint/2010/main" val="333344436"/>
+        <p14:creationId xmlns:p14="http://schemas.microsoft.com/office/powerpoint/2010/main" val="2634495189"/>
       </p:ext>
     </p:extLst>
   </p:cSld>
@@ -14616,7 +14872,7 @@
         <p:spPr>
           <a:xfrm>
             <a:off x="680321" y="2336873"/>
-            <a:ext cx="6112365" cy="3599316"/>
+            <a:ext cx="6315565" cy="2046441"/>
           </a:xfrm>
         </p:spPr>
         <p:txBody>
@@ -14632,7 +14888,7 @@
             <a:pPr lvl="1"/>
             <a:r>
               <a:rPr lang="en-US" dirty="0"/>
-              <a:t>Arrange your objects, creating and setting them up as necessary.</a:t>
+              <a:t>Arrange your objects, creating and setting them up, as necessary.</a:t>
             </a:r>
           </a:p>
           <a:p>
@@ -14648,15 +14904,6 @@
               <a:rPr lang="en-US" dirty="0"/>
               <a:t>Assert that something is as expected.</a:t>
             </a:r>
-          </a:p>
-          <a:p>
-            <a:r>
-              <a:rPr lang="en-US" dirty="0"/>
-              <a:t>Avoid writing the assert line and the method call in the same statement</a:t>
-            </a:r>
-          </a:p>
-          <a:p>
-            <a:endParaRPr lang="en-US" dirty="0"/>
           </a:p>
         </p:txBody>
       </p:sp>
@@ -14682,8 +14929,237 @@
         </p:blipFill>
         <p:spPr>
           <a:xfrm>
-            <a:off x="6792686" y="2574688"/>
+            <a:off x="6995886" y="2336873"/>
             <a:ext cx="4876130" cy="2463621"/>
+          </a:xfrm>
+          <a:prstGeom prst="rect">
+            <a:avLst/>
+          </a:prstGeom>
+        </p:spPr>
+      </p:pic>
+      <p:sp>
+        <p:nvSpPr>
+          <p:cNvPr id="5" name="Content Placeholder 2">
+            <a:extLst>
+              <a:ext uri="{FF2B5EF4-FFF2-40B4-BE49-F238E27FC236}">
+                <a16:creationId xmlns:a16="http://schemas.microsoft.com/office/drawing/2014/main" id="{F990E07B-2364-401E-9368-0D947FE78811}"/>
+              </a:ext>
+            </a:extLst>
+          </p:cNvPr>
+          <p:cNvSpPr txBox="1">
+            <a:spLocks/>
+          </p:cNvSpPr>
+          <p:nvPr/>
+        </p:nvSpPr>
+        <p:spPr>
+          <a:xfrm>
+            <a:off x="680321" y="5016428"/>
+            <a:ext cx="6090593" cy="774773"/>
+          </a:xfrm>
+          <a:prstGeom prst="rect">
+            <a:avLst/>
+          </a:prstGeom>
+        </p:spPr>
+        <p:txBody>
+          <a:bodyPr vert="horz" lIns="91440" tIns="45720" rIns="91440" bIns="45720" rtlCol="0">
+            <a:normAutofit/>
+          </a:bodyPr>
+          <a:lstStyle>
+            <a:lvl1pPr marL="228600" indent="-228600" algn="l" defTabSz="914400" rtl="0" eaLnBrk="1" latinLnBrk="0" hangingPunct="1">
+              <a:lnSpc>
+                <a:spcPct val="90000"/>
+              </a:lnSpc>
+              <a:spcBef>
+                <a:spcPts val="1000"/>
+              </a:spcBef>
+              <a:buFont typeface="Arial" panose="020B0604020202020204" pitchFamily="34" charset="0"/>
+              <a:buChar char="•"/>
+              <a:defRPr sz="2400" kern="1200">
+                <a:solidFill>
+                  <a:schemeClr val="tx1"/>
+                </a:solidFill>
+                <a:latin typeface="+mn-lt"/>
+                <a:ea typeface="+mn-ea"/>
+                <a:cs typeface="+mn-cs"/>
+              </a:defRPr>
+            </a:lvl1pPr>
+            <a:lvl2pPr marL="685800" indent="-228600" algn="l" defTabSz="914400" rtl="0" eaLnBrk="1" latinLnBrk="0" hangingPunct="1">
+              <a:lnSpc>
+                <a:spcPct val="90000"/>
+              </a:lnSpc>
+              <a:spcBef>
+                <a:spcPts val="500"/>
+              </a:spcBef>
+              <a:buFont typeface="Arial" panose="020B0604020202020204" pitchFamily="34" charset="0"/>
+              <a:buChar char="•"/>
+              <a:defRPr sz="2000" kern="1200">
+                <a:solidFill>
+                  <a:schemeClr val="tx1"/>
+                </a:solidFill>
+                <a:latin typeface="+mn-lt"/>
+                <a:ea typeface="+mn-ea"/>
+                <a:cs typeface="+mn-cs"/>
+              </a:defRPr>
+            </a:lvl2pPr>
+            <a:lvl3pPr marL="1143000" indent="-228600" algn="l" defTabSz="914400" rtl="0" eaLnBrk="1" latinLnBrk="0" hangingPunct="1">
+              <a:lnSpc>
+                <a:spcPct val="90000"/>
+              </a:lnSpc>
+              <a:spcBef>
+                <a:spcPts val="500"/>
+              </a:spcBef>
+              <a:buFont typeface="Arial" panose="020B0604020202020204" pitchFamily="34" charset="0"/>
+              <a:buChar char="•"/>
+              <a:defRPr sz="1800" kern="1200">
+                <a:solidFill>
+                  <a:schemeClr val="tx1"/>
+                </a:solidFill>
+                <a:latin typeface="+mn-lt"/>
+                <a:ea typeface="+mn-ea"/>
+                <a:cs typeface="+mn-cs"/>
+              </a:defRPr>
+            </a:lvl3pPr>
+            <a:lvl4pPr marL="1600200" indent="-228600" algn="l" defTabSz="914400" rtl="0" eaLnBrk="1" latinLnBrk="0" hangingPunct="1">
+              <a:lnSpc>
+                <a:spcPct val="90000"/>
+              </a:lnSpc>
+              <a:spcBef>
+                <a:spcPts val="500"/>
+              </a:spcBef>
+              <a:buFont typeface="Arial" panose="020B0604020202020204" pitchFamily="34" charset="0"/>
+              <a:buChar char="•"/>
+              <a:defRPr sz="1600" kern="1200">
+                <a:solidFill>
+                  <a:schemeClr val="tx1"/>
+                </a:solidFill>
+                <a:latin typeface="+mn-lt"/>
+                <a:ea typeface="+mn-ea"/>
+                <a:cs typeface="+mn-cs"/>
+              </a:defRPr>
+            </a:lvl4pPr>
+            <a:lvl5pPr marL="2057400" indent="-228600" algn="l" defTabSz="914400" rtl="0" eaLnBrk="1" latinLnBrk="0" hangingPunct="1">
+              <a:lnSpc>
+                <a:spcPct val="90000"/>
+              </a:lnSpc>
+              <a:spcBef>
+                <a:spcPts val="500"/>
+              </a:spcBef>
+              <a:buFont typeface="Arial" panose="020B0604020202020204" pitchFamily="34" charset="0"/>
+              <a:buChar char="•"/>
+              <a:defRPr sz="1600" kern="1200">
+                <a:solidFill>
+                  <a:schemeClr val="tx1"/>
+                </a:solidFill>
+                <a:latin typeface="+mn-lt"/>
+                <a:ea typeface="+mn-ea"/>
+                <a:cs typeface="+mn-cs"/>
+              </a:defRPr>
+            </a:lvl5pPr>
+            <a:lvl6pPr marL="2514600" indent="-228600" algn="l" defTabSz="914400" rtl="0" eaLnBrk="1" latinLnBrk="0" hangingPunct="1">
+              <a:lnSpc>
+                <a:spcPct val="90000"/>
+              </a:lnSpc>
+              <a:spcBef>
+                <a:spcPts val="500"/>
+              </a:spcBef>
+              <a:buFont typeface="Arial" panose="020B0604020202020204" pitchFamily="34" charset="0"/>
+              <a:buChar char="•"/>
+              <a:defRPr sz="1400" kern="1200">
+                <a:solidFill>
+                  <a:schemeClr val="tx1"/>
+                </a:solidFill>
+                <a:latin typeface="+mn-lt"/>
+                <a:ea typeface="+mn-ea"/>
+                <a:cs typeface="+mn-cs"/>
+              </a:defRPr>
+            </a:lvl6pPr>
+            <a:lvl7pPr marL="2971800" indent="-228600" algn="l" defTabSz="914400" rtl="0" eaLnBrk="1" latinLnBrk="0" hangingPunct="1">
+              <a:lnSpc>
+                <a:spcPct val="90000"/>
+              </a:lnSpc>
+              <a:spcBef>
+                <a:spcPts val="500"/>
+              </a:spcBef>
+              <a:buFont typeface="Arial" panose="020B0604020202020204" pitchFamily="34" charset="0"/>
+              <a:buChar char="•"/>
+              <a:defRPr sz="1400" kern="1200">
+                <a:solidFill>
+                  <a:schemeClr val="tx1"/>
+                </a:solidFill>
+                <a:latin typeface="+mn-lt"/>
+                <a:ea typeface="+mn-ea"/>
+                <a:cs typeface="+mn-cs"/>
+              </a:defRPr>
+            </a:lvl7pPr>
+            <a:lvl8pPr marL="3429000" indent="-228600" algn="l" defTabSz="914400" rtl="0" eaLnBrk="1" latinLnBrk="0" hangingPunct="1">
+              <a:lnSpc>
+                <a:spcPct val="90000"/>
+              </a:lnSpc>
+              <a:spcBef>
+                <a:spcPts val="500"/>
+              </a:spcBef>
+              <a:buFont typeface="Arial" panose="020B0604020202020204" pitchFamily="34" charset="0"/>
+              <a:buChar char="•"/>
+              <a:defRPr sz="1400" kern="1200">
+                <a:solidFill>
+                  <a:schemeClr val="tx1"/>
+                </a:solidFill>
+                <a:latin typeface="+mn-lt"/>
+                <a:ea typeface="+mn-ea"/>
+                <a:cs typeface="+mn-cs"/>
+              </a:defRPr>
+            </a:lvl8pPr>
+            <a:lvl9pPr marL="3886200" indent="-228600" algn="l" defTabSz="914400" rtl="0" eaLnBrk="1" latinLnBrk="0" hangingPunct="1">
+              <a:lnSpc>
+                <a:spcPct val="90000"/>
+              </a:lnSpc>
+              <a:spcBef>
+                <a:spcPts val="500"/>
+              </a:spcBef>
+              <a:buFont typeface="Arial" panose="020B0604020202020204" pitchFamily="34" charset="0"/>
+              <a:buChar char="•"/>
+              <a:defRPr sz="1400" kern="1200">
+                <a:solidFill>
+                  <a:schemeClr val="tx1"/>
+                </a:solidFill>
+                <a:latin typeface="+mn-lt"/>
+                <a:ea typeface="+mn-ea"/>
+                <a:cs typeface="+mn-cs"/>
+              </a:defRPr>
+            </a:lvl9pPr>
+          </a:lstStyle>
+          <a:p>
+            <a:r>
+              <a:rPr lang="en-US" dirty="0"/>
+              <a:t>Avoid writing the assert line and the method call in the same statement</a:t>
+            </a:r>
+          </a:p>
+        </p:txBody>
+      </p:sp>
+      <p:pic>
+        <p:nvPicPr>
+          <p:cNvPr id="7" name="Picture 6">
+            <a:extLst>
+              <a:ext uri="{FF2B5EF4-FFF2-40B4-BE49-F238E27FC236}">
+                <a16:creationId xmlns:a16="http://schemas.microsoft.com/office/drawing/2014/main" id="{0912BCC9-F9E3-47C4-B0D2-5AEBD85802FD}"/>
+              </a:ext>
+            </a:extLst>
+          </p:cNvPr>
+          <p:cNvPicPr>
+            <a:picLocks noChangeAspect="1"/>
+          </p:cNvPicPr>
+          <p:nvPr/>
+        </p:nvPicPr>
+        <p:blipFill>
+          <a:blip r:embed="rId4"/>
+          <a:stretch>
+            <a:fillRect/>
+          </a:stretch>
+        </p:blipFill>
+        <p:spPr>
+          <a:xfrm>
+            <a:off x="6995886" y="5016428"/>
+            <a:ext cx="2952750" cy="819150"/>
           </a:xfrm>
           <a:prstGeom prst="rect">
             <a:avLst/>
@@ -14875,7 +15351,7 @@
                             </p:stCondLst>
                             <p:childTnLst>
                               <p:par>
-                                <p:cTn id="15" presetID="1" presetClass="entr" presetSubtype="0" fill="hold" grpId="0" nodeType="clickEffect">
+                                <p:cTn id="15" presetID="1" presetClass="entr" presetSubtype="0" fill="hold" nodeType="clickEffect">
                                   <p:stCondLst>
                                     <p:cond delay="0"/>
                                   </p:stCondLst>
@@ -14888,11 +15364,7 @@
                                           </p:stCondLst>
                                         </p:cTn>
                                         <p:tgtEl>
-                                          <p:spTgt spid="3">
-                                            <p:txEl>
-                                              <p:pRg st="4" end="4"/>
-                                            </p:txEl>
-                                          </p:spTgt>
+                                          <p:spTgt spid="4"/>
                                         </p:tgtEl>
                                         <p:attrNameLst>
                                           <p:attrName>style.visibility</p:attrName>
@@ -14924,7 +15396,7 @@
                             </p:stCondLst>
                             <p:childTnLst>
                               <p:par>
-                                <p:cTn id="19" presetID="1" presetClass="entr" presetSubtype="0" fill="hold" nodeType="clickEffect">
+                                <p:cTn id="19" presetID="1" presetClass="entr" presetSubtype="0" fill="hold" grpId="0" nodeType="clickEffect">
                                   <p:stCondLst>
                                     <p:cond delay="0"/>
                                   </p:stCondLst>
@@ -14937,7 +15409,52 @@
                                           </p:stCondLst>
                                         </p:cTn>
                                         <p:tgtEl>
-                                          <p:spTgt spid="4"/>
+                                          <p:spTgt spid="5"/>
+                                        </p:tgtEl>
+                                        <p:attrNameLst>
+                                          <p:attrName>style.visibility</p:attrName>
+                                        </p:attrNameLst>
+                                      </p:cBhvr>
+                                      <p:to>
+                                        <p:strVal val="visible"/>
+                                      </p:to>
+                                    </p:set>
+                                  </p:childTnLst>
+                                </p:cTn>
+                              </p:par>
+                            </p:childTnLst>
+                          </p:cTn>
+                        </p:par>
+                      </p:childTnLst>
+                    </p:cTn>
+                  </p:par>
+                  <p:par>
+                    <p:cTn id="21" fill="hold">
+                      <p:stCondLst>
+                        <p:cond delay="indefinite"/>
+                      </p:stCondLst>
+                      <p:childTnLst>
+                        <p:par>
+                          <p:cTn id="22" fill="hold">
+                            <p:stCondLst>
+                              <p:cond delay="0"/>
+                            </p:stCondLst>
+                            <p:childTnLst>
+                              <p:par>
+                                <p:cTn id="23" presetID="1" presetClass="entr" presetSubtype="0" fill="hold" nodeType="clickEffect">
+                                  <p:stCondLst>
+                                    <p:cond delay="0"/>
+                                  </p:stCondLst>
+                                  <p:childTnLst>
+                                    <p:set>
+                                      <p:cBhvr>
+                                        <p:cTn id="24" dur="1" fill="hold">
+                                          <p:stCondLst>
+                                            <p:cond delay="0"/>
+                                          </p:stCondLst>
+                                        </p:cTn>
+                                        <p:tgtEl>
+                                          <p:spTgt spid="7"/>
                                         </p:tgtEl>
                                         <p:attrNameLst>
                                           <p:attrName>style.visibility</p:attrName>
@@ -14979,6 +15496,7 @@
     </p:tnLst>
     <p:bldLst>
       <p:bldP spid="3" grpId="0" build="p"/>
+      <p:bldP spid="5" grpId="0"/>
     </p:bldLst>
   </p:timing>
 </p:sld>
@@ -21056,52 +21574,37 @@
           <a:lstStyle/>
           <a:p>
             <a:r>
-              <a:rPr lang="en-US" dirty="0">
-                <a:hlinkClick r:id="rId2"/>
+              <a:rPr lang="en-US" dirty="0" err="1">
+                <a:hlinkClick r:id="rId3"/>
               </a:rPr>
-              <a:t>XUnit Test Patterns</a:t>
-            </a:r>
-            <a:endParaRPr lang="bg-BG" dirty="0">
-              <a:hlinkClick r:id="rId3"/>
-            </a:endParaRPr>
-          </a:p>
-          <a:p>
+              <a:t>XUnit</a:t>
+            </a:r>
             <a:r>
               <a:rPr lang="en-US" dirty="0">
                 <a:hlinkClick r:id="rId3"/>
               </a:rPr>
-              <a:t>Test Pyramid</a:t>
-            </a:r>
-            <a:r>
-              <a:rPr lang="en-US" dirty="0"/>
-              <a:t> and </a:t>
-            </a:r>
+              <a:t> Test Patterns</a:t>
+            </a:r>
+            <a:endParaRPr lang="bg-BG" dirty="0">
+              <a:hlinkClick r:id="rId4"/>
+            </a:endParaRPr>
+          </a:p>
+          <a:p>
             <a:r>
               <a:rPr lang="en-US" dirty="0">
                 <a:hlinkClick r:id="rId4"/>
               </a:rPr>
-              <a:t>Practical Test Pyramid</a:t>
-            </a:r>
-            <a:endParaRPr lang="en-US" dirty="0"/>
-          </a:p>
-          <a:p>
+              <a:t>Test Pyramid</a:t>
+            </a:r>
+            <a:r>
+              <a:rPr lang="en-US" dirty="0"/>
+              <a:t> and </a:t>
+            </a:r>
             <a:r>
               <a:rPr lang="en-US" dirty="0">
                 <a:hlinkClick r:id="rId5"/>
               </a:rPr>
-              <a:t>Why Did we Build </a:t>
-            </a:r>
-            <a:r>
-              <a:rPr lang="en-US" dirty="0" err="1">
-                <a:hlinkClick r:id="rId5"/>
-              </a:rPr>
-              <a:t>xUnit</a:t>
-            </a:r>
-            <a:r>
-              <a:rPr lang="en-US" dirty="0">
-                <a:hlinkClick r:id="rId5"/>
-              </a:rPr>
-              <a:t> 1.0?</a:t>
+              <a:t>Practical Test Pyramid</a:t>
             </a:r>
             <a:endParaRPr lang="en-US" dirty="0"/>
           </a:p>
@@ -21110,37 +21613,19 @@
               <a:rPr lang="en-US" dirty="0">
                 <a:hlinkClick r:id="rId6"/>
               </a:rPr>
-              <a:t>Why you should not use </a:t>
+              <a:t>Why Did we Build </a:t>
             </a:r>
             <a:r>
               <a:rPr lang="en-US" dirty="0" err="1">
                 <a:hlinkClick r:id="rId6"/>
               </a:rPr>
-              <a:t>SetUp</a:t>
+              <a:t>xUnit</a:t>
             </a:r>
             <a:r>
               <a:rPr lang="en-US" dirty="0">
                 <a:hlinkClick r:id="rId6"/>
               </a:rPr>
-              <a:t> and </a:t>
-            </a:r>
-            <a:r>
-              <a:rPr lang="en-US" dirty="0" err="1">
-                <a:hlinkClick r:id="rId6"/>
-              </a:rPr>
-              <a:t>TearDown</a:t>
-            </a:r>
-            <a:r>
-              <a:rPr lang="en-US" dirty="0">
-                <a:hlinkClick r:id="rId6"/>
-              </a:rPr>
-              <a:t> in </a:t>
-            </a:r>
-            <a:r>
-              <a:rPr lang="en-US" dirty="0" err="1">
-                <a:hlinkClick r:id="rId6"/>
-              </a:rPr>
-              <a:t>Nunit</a:t>
+              <a:t> 1.0?</a:t>
             </a:r>
             <a:endParaRPr lang="en-US" dirty="0"/>
           </a:p>
@@ -21149,26 +21634,56 @@
               <a:rPr lang="en-US" dirty="0">
                 <a:hlinkClick r:id="rId7"/>
               </a:rPr>
-              <a:t>Fluent builder pattern</a:t>
-            </a:r>
-            <a:r>
-              <a:rPr lang="en-US" dirty="0"/>
+              <a:t>Why you should not use </a:t>
+            </a:r>
+            <a:r>
+              <a:rPr lang="en-US" dirty="0" err="1">
+                <a:hlinkClick r:id="rId7"/>
+              </a:rPr>
+              <a:t>SetUp</a:t>
+            </a:r>
+            <a:r>
+              <a:rPr lang="en-US" dirty="0">
+                <a:hlinkClick r:id="rId7"/>
+              </a:rPr>
               <a:t> and </a:t>
             </a:r>
+            <a:r>
+              <a:rPr lang="en-US" dirty="0" err="1">
+                <a:hlinkClick r:id="rId7"/>
+              </a:rPr>
+              <a:t>TearDown</a:t>
+            </a:r>
+            <a:r>
+              <a:rPr lang="en-US" dirty="0">
+                <a:hlinkClick r:id="rId7"/>
+              </a:rPr>
+              <a:t> in </a:t>
+            </a:r>
+            <a:r>
+              <a:rPr lang="en-US" dirty="0" err="1">
+                <a:hlinkClick r:id="rId7"/>
+              </a:rPr>
+              <a:t>Nunit</a:t>
+            </a:r>
+            <a:endParaRPr lang="en-US" dirty="0"/>
+          </a:p>
+          <a:p>
             <a:r>
               <a:rPr lang="en-US" dirty="0">
                 <a:hlinkClick r:id="rId8"/>
               </a:rPr>
-              <a:t>ObjectMother</a:t>
-            </a:r>
-            <a:endParaRPr lang="en-US" dirty="0"/>
-          </a:p>
-          <a:p>
+              <a:t>Fluent builder pattern</a:t>
+            </a:r>
+            <a:r>
+              <a:rPr lang="en-US" dirty="0"/>
+              <a:t> and </a:t>
+            </a:r>
             <a:r>
               <a:rPr lang="en-US" dirty="0">
                 <a:hlinkClick r:id="rId9"/>
               </a:rPr>
-              <a:t>Unit testing best practices with .NET Core and .NET Standard</a:t>
+              <a:t>ObjectMother</a:t>
             </a:r>
             <a:endParaRPr lang="en-US" dirty="0"/>
           </a:p>
@@ -21177,7 +21692,7 @@
               <a:rPr lang="en-US" dirty="0">
                 <a:hlinkClick r:id="rId10"/>
               </a:rPr>
-              <a:t>Mocks, Fakes, Stubs and Dummies </a:t>
+              <a:t>Unit testing best practices with .NET Core and .NET Standard</a:t>
             </a:r>
             <a:endParaRPr lang="en-US" dirty="0"/>
           </a:p>
@@ -21185,6 +21700,15 @@
             <a:r>
               <a:rPr lang="en-US" dirty="0">
                 <a:hlinkClick r:id="rId11"/>
+              </a:rPr>
+              <a:t>Mocks, Fakes, Stubs and Dummies </a:t>
+            </a:r>
+            <a:endParaRPr lang="en-US" dirty="0"/>
+          </a:p>
+          <a:p>
+            <a:r>
+              <a:rPr lang="en-US" dirty="0">
+                <a:hlinkClick r:id="rId12"/>
               </a:rPr>
               <a:t>TestDouble</a:t>
             </a:r>
@@ -21488,6 +22012,87 @@
           </a:p>
         </p:txBody>
       </p:sp>
+      <p:sp>
+        <p:nvSpPr>
+          <p:cNvPr id="5" name="TextBox 4">
+            <a:extLst>
+              <a:ext uri="{FF2B5EF4-FFF2-40B4-BE49-F238E27FC236}">
+                <a16:creationId xmlns:a16="http://schemas.microsoft.com/office/drawing/2014/main" id="{E2E1E18A-DCB0-4690-B3E4-5CCBA5F1CE34}"/>
+              </a:ext>
+            </a:extLst>
+          </p:cNvPr>
+          <p:cNvSpPr txBox="1"/>
+          <p:nvPr/>
+        </p:nvSpPr>
+        <p:spPr>
+          <a:xfrm>
+            <a:off x="0" y="4312194"/>
+            <a:ext cx="4472249" cy="523220"/>
+          </a:xfrm>
+          <a:prstGeom prst="rect">
+            <a:avLst/>
+          </a:prstGeom>
+          <a:noFill/>
+        </p:spPr>
+        <p:txBody>
+          <a:bodyPr wrap="square" rtlCol="0">
+            <a:spAutoFit/>
+          </a:bodyPr>
+          <a:lstStyle/>
+          <a:p>
+            <a:r>
+              <a:rPr lang="en-US" sz="2800" dirty="0">
+                <a:effectLst>
+                  <a:outerShdw blurRad="38100" dist="38100" dir="2700000" algn="tl">
+                    <a:srgbClr val="000000">
+                      <a:alpha val="43137"/>
+                    </a:srgbClr>
+                  </a:outerShdw>
+                </a:effectLst>
+              </a:rPr>
+              <a:t>Slides and demo project: </a:t>
+            </a:r>
+          </a:p>
+        </p:txBody>
+      </p:sp>
+      <p:sp>
+        <p:nvSpPr>
+          <p:cNvPr id="6" name="TextBox 5">
+            <a:extLst>
+              <a:ext uri="{FF2B5EF4-FFF2-40B4-BE49-F238E27FC236}">
+                <a16:creationId xmlns:a16="http://schemas.microsoft.com/office/drawing/2014/main" id="{F5228745-B11A-4753-A8E4-1E6036907F8F}"/>
+              </a:ext>
+            </a:extLst>
+          </p:cNvPr>
+          <p:cNvSpPr txBox="1"/>
+          <p:nvPr/>
+        </p:nvSpPr>
+        <p:spPr>
+          <a:xfrm>
+            <a:off x="4376868" y="4373749"/>
+            <a:ext cx="4841554" cy="461665"/>
+          </a:xfrm>
+          <a:prstGeom prst="rect">
+            <a:avLst/>
+          </a:prstGeom>
+          <a:noFill/>
+        </p:spPr>
+        <p:txBody>
+          <a:bodyPr wrap="square" rtlCol="0">
+            <a:spAutoFit/>
+          </a:bodyPr>
+          <a:lstStyle/>
+          <a:p>
+            <a:r>
+              <a:rPr lang="en-US" sz="2400" dirty="0">
+                <a:hlinkClick r:id="rId3"/>
+              </a:rPr>
+              <a:t>http://bit.ly/devbg-april-dotnet</a:t>
+            </a:r>
+            <a:endParaRPr lang="en-US" sz="2400" dirty="0"/>
+          </a:p>
+        </p:txBody>
+      </p:sp>
     </p:spTree>
     <p:extLst>
       <p:ext uri="{BB962C8B-B14F-4D97-AF65-F5344CB8AC3E}">
@@ -21588,7 +22193,7 @@
         </p:nvSpPr>
         <p:spPr>
           <a:xfrm>
-            <a:off x="3011639" y="4126305"/>
+            <a:off x="3069696" y="4509835"/>
             <a:ext cx="4506686" cy="523220"/>
           </a:xfrm>
           <a:prstGeom prst="rect">

</xml_diff>